<commit_message>
Day Eight - Changes to PPT (corrections)
</commit_message>
<xml_diff>
--- a/Unit One/src/com/bayviewglen/dayeight/Day 8 - Number Systems.pptx
+++ b/Unit One/src/com/bayviewglen/dayeight/Day 8 - Number Systems.pptx
@@ -5,7 +5,7 @@
     <p:sldMasterId id="2147483660" r:id="rId1"/>
   </p:sldMasterIdLst>
   <p:notesMasterIdLst>
-    <p:notesMasterId r:id="rId22"/>
+    <p:notesMasterId r:id="rId24"/>
   </p:notesMasterIdLst>
   <p:sldIdLst>
     <p:sldId id="256" r:id="rId2"/>
@@ -19,15 +19,17 @@
     <p:sldId id="260" r:id="rId10"/>
     <p:sldId id="261" r:id="rId11"/>
     <p:sldId id="273" r:id="rId12"/>
-    <p:sldId id="274" r:id="rId13"/>
-    <p:sldId id="262" r:id="rId14"/>
-    <p:sldId id="263" r:id="rId15"/>
-    <p:sldId id="264" r:id="rId16"/>
-    <p:sldId id="265" r:id="rId17"/>
-    <p:sldId id="269" r:id="rId18"/>
-    <p:sldId id="271" r:id="rId19"/>
-    <p:sldId id="272" r:id="rId20"/>
-    <p:sldId id="275" r:id="rId21"/>
+    <p:sldId id="276" r:id="rId13"/>
+    <p:sldId id="277" r:id="rId14"/>
+    <p:sldId id="274" r:id="rId15"/>
+    <p:sldId id="262" r:id="rId16"/>
+    <p:sldId id="263" r:id="rId17"/>
+    <p:sldId id="264" r:id="rId18"/>
+    <p:sldId id="265" r:id="rId19"/>
+    <p:sldId id="269" r:id="rId20"/>
+    <p:sldId id="271" r:id="rId21"/>
+    <p:sldId id="272" r:id="rId22"/>
+    <p:sldId id="275" r:id="rId23"/>
   </p:sldIdLst>
   <p:sldSz cx="9144000" cy="6858000" type="screen4x3"/>
   <p:notesSz cx="6858000" cy="9144000"/>
@@ -227,7 +229,7 @@
           <a:p>
             <a:fld id="{129C44BE-6FFD-421A-A1D3-6BEF29A9B9E6}" type="datetimeFigureOut">
               <a:rPr lang="en-US" smtClean="0"/>
-              <a:t>9/22/2014</a:t>
+              <a:t>9/24/2014</a:t>
             </a:fld>
             <a:endParaRPr lang="en-US"/>
           </a:p>
@@ -663,7 +665,7 @@
           <a:p>
             <a:fld id="{B73D327A-8494-4698-858E-03053C31046C}" type="slidenum">
               <a:rPr lang="en-US" smtClean="0"/>
-              <a:t>17</a:t>
+              <a:t>19</a:t>
             </a:fld>
             <a:endParaRPr lang="en-US"/>
           </a:p>
@@ -889,7 +891,7 @@
           <a:p>
             <a:fld id="{1AF88322-41B9-4338-B63E-58640276C619}" type="datetimeFigureOut">
               <a:rPr lang="en-US" smtClean="0"/>
-              <a:t>9/22/2014</a:t>
+              <a:t>9/24/2014</a:t>
             </a:fld>
             <a:endParaRPr lang="en-US"/>
           </a:p>
@@ -1083,7 +1085,7 @@
           <a:p>
             <a:fld id="{1AF88322-41B9-4338-B63E-58640276C619}" type="datetimeFigureOut">
               <a:rPr lang="en-US" smtClean="0"/>
-              <a:t>9/22/2014</a:t>
+              <a:t>9/24/2014</a:t>
             </a:fld>
             <a:endParaRPr lang="en-US"/>
           </a:p>
@@ -1271,7 +1273,7 @@
           <a:p>
             <a:fld id="{1AF88322-41B9-4338-B63E-58640276C619}" type="datetimeFigureOut">
               <a:rPr lang="en-US" smtClean="0"/>
-              <a:t>9/22/2014</a:t>
+              <a:t>9/24/2014</a:t>
             </a:fld>
             <a:endParaRPr lang="en-US"/>
           </a:p>
@@ -1500,7 +1502,7 @@
           <a:p>
             <a:fld id="{1AF88322-41B9-4338-B63E-58640276C619}" type="datetimeFigureOut">
               <a:rPr lang="en-US" smtClean="0"/>
-              <a:t>9/22/2014</a:t>
+              <a:t>9/24/2014</a:t>
             </a:fld>
             <a:endParaRPr lang="en-US"/>
           </a:p>
@@ -1781,7 +1783,7 @@
           <a:p>
             <a:fld id="{1AF88322-41B9-4338-B63E-58640276C619}" type="datetimeFigureOut">
               <a:rPr lang="en-US" smtClean="0"/>
-              <a:t>9/22/2014</a:t>
+              <a:t>9/24/2014</a:t>
             </a:fld>
             <a:endParaRPr lang="en-US"/>
           </a:p>
@@ -2069,7 +2071,7 @@
           <a:p>
             <a:fld id="{1AF88322-41B9-4338-B63E-58640276C619}" type="datetimeFigureOut">
               <a:rPr lang="en-US" smtClean="0"/>
-              <a:t>9/22/2014</a:t>
+              <a:t>9/24/2014</a:t>
             </a:fld>
             <a:endParaRPr lang="en-US"/>
           </a:p>
@@ -2623,7 +2625,7 @@
           <a:p>
             <a:fld id="{1AF88322-41B9-4338-B63E-58640276C619}" type="datetimeFigureOut">
               <a:rPr lang="en-US" smtClean="0"/>
-              <a:t>9/22/2014</a:t>
+              <a:t>9/24/2014</a:t>
             </a:fld>
             <a:endParaRPr lang="en-US"/>
           </a:p>
@@ -2754,7 +2756,7 @@
           <a:p>
             <a:fld id="{1AF88322-41B9-4338-B63E-58640276C619}" type="datetimeFigureOut">
               <a:rPr lang="en-US" smtClean="0"/>
-              <a:t>9/22/2014</a:t>
+              <a:t>9/24/2014</a:t>
             </a:fld>
             <a:endParaRPr lang="en-US"/>
           </a:p>
@@ -2904,7 +2906,7 @@
           <a:p>
             <a:fld id="{1AF88322-41B9-4338-B63E-58640276C619}" type="datetimeFigureOut">
               <a:rPr lang="en-US" smtClean="0"/>
-              <a:t>9/22/2014</a:t>
+              <a:t>9/24/2014</a:t>
             </a:fld>
             <a:endParaRPr lang="en-US"/>
           </a:p>
@@ -3225,7 +3227,7 @@
           <a:p>
             <a:fld id="{1AF88322-41B9-4338-B63E-58640276C619}" type="datetimeFigureOut">
               <a:rPr lang="en-US" smtClean="0"/>
-              <a:t>9/22/2014</a:t>
+              <a:t>9/24/2014</a:t>
             </a:fld>
             <a:endParaRPr lang="en-US"/>
           </a:p>
@@ -3522,7 +3524,7 @@
           <a:p>
             <a:fld id="{1AF88322-41B9-4338-B63E-58640276C619}" type="datetimeFigureOut">
               <a:rPr lang="en-US" smtClean="0"/>
-              <a:t>9/22/2014</a:t>
+              <a:t>9/24/2014</a:t>
             </a:fld>
             <a:endParaRPr lang="en-US"/>
           </a:p>
@@ -3767,7 +3769,7 @@
           <a:p>
             <a:fld id="{1AF88322-41B9-4338-B63E-58640276C619}" type="datetimeFigureOut">
               <a:rPr lang="en-US" smtClean="0"/>
-              <a:t>9/22/2014</a:t>
+              <a:t>9/24/2014</a:t>
             </a:fld>
             <a:endParaRPr lang="en-US"/>
           </a:p>
@@ -4803,7 +4805,7 @@
               <a:t>byte(2</a:t>
             </a:r>
             <a:r>
-              <a:rPr lang="en-US" baseline="-25000" dirty="0" smtClean="0"/>
+              <a:rPr lang="en-US" baseline="30000" dirty="0" smtClean="0"/>
               <a:t>7</a:t>
             </a:r>
             <a:r>
@@ -4815,7 +4817,7 @@
               <a:t>– 1) =&gt; </a:t>
             </a:r>
             <a:r>
-              <a:rPr lang="en-US" smtClean="0"/>
+              <a:rPr lang="en-US" dirty="0" err="1" smtClean="0"/>
               <a:t>Byte.MAX_VALUE</a:t>
             </a:r>
             <a:endParaRPr lang="en-US" dirty="0" smtClean="0"/>
@@ -4947,6 +4949,13 @@
   <p:clrMapOvr>
     <a:masterClrMapping/>
   </p:clrMapOvr>
+  <p:timing>
+    <p:tnLst>
+      <p:par>
+        <p:cTn id="1" dur="indefinite" restart="never" nodeType="tmRoot"/>
+      </p:par>
+    </p:tnLst>
+  </p:timing>
 </p:sld>
 </file>
 
@@ -4979,229 +4988,56 @@
         </p:nvSpPr>
         <p:spPr/>
         <p:txBody>
-          <a:bodyPr>
-            <a:normAutofit fontScale="90000"/>
-          </a:bodyPr>
-          <a:lstStyle/>
-          <a:p>
-            <a:r>
-              <a:rPr lang="en-US" dirty="0" smtClean="0"/>
-              <a:t>Smallest Possible Integer Values</a:t>
-            </a:r>
-            <a:endParaRPr lang="en-US" dirty="0"/>
-          </a:p>
-        </p:txBody>
-      </p:sp>
-      <p:sp>
-        <p:nvSpPr>
-          <p:cNvPr id="3" name="Content Placeholder 2"/>
-          <p:cNvSpPr>
-            <a:spLocks noGrp="1"/>
-          </p:cNvSpPr>
-          <p:nvPr>
-            <p:ph idx="1"/>
-          </p:nvPr>
-        </p:nvSpPr>
-        <p:spPr/>
-        <p:txBody>
           <a:bodyPr/>
           <a:lstStyle/>
           <a:p>
             <a:r>
-              <a:rPr lang="en-US" dirty="0"/>
-              <a:t>short (</a:t>
-            </a:r>
-            <a:r>
-              <a:rPr lang="en-US" dirty="0" smtClean="0"/>
-              <a:t>2</a:t>
-            </a:r>
-            <a:r>
-              <a:rPr lang="en-US" baseline="30000" dirty="0" smtClean="0"/>
-              <a:t>15</a:t>
-            </a:r>
-            <a:r>
-              <a:rPr lang="en-US" dirty="0" smtClean="0"/>
-              <a:t>) </a:t>
-            </a:r>
-            <a:r>
-              <a:rPr lang="en-US" dirty="0"/>
-              <a:t>=&gt; </a:t>
-            </a:r>
-            <a:r>
-              <a:rPr lang="en-US" dirty="0" err="1" smtClean="0"/>
-              <a:t>Short.MIN_VALUE</a:t>
-            </a:r>
-            <a:endParaRPr lang="en-US" dirty="0"/>
-          </a:p>
-          <a:p>
-            <a:r>
-              <a:rPr lang="en-US" dirty="0" err="1"/>
-              <a:t>int</a:t>
-            </a:r>
-            <a:r>
-              <a:rPr lang="en-US" dirty="0"/>
-              <a:t> (</a:t>
-            </a:r>
-            <a:r>
-              <a:rPr lang="en-US" dirty="0" smtClean="0"/>
-              <a:t>2</a:t>
-            </a:r>
-            <a:r>
-              <a:rPr lang="en-US" baseline="30000" dirty="0" smtClean="0"/>
-              <a:t>31</a:t>
-            </a:r>
-            <a:r>
-              <a:rPr lang="en-US" dirty="0" smtClean="0"/>
-              <a:t>) </a:t>
-            </a:r>
-            <a:r>
-              <a:rPr lang="en-US" dirty="0"/>
-              <a:t>=&gt; </a:t>
-            </a:r>
-            <a:r>
-              <a:rPr lang="en-US" dirty="0" err="1" smtClean="0"/>
-              <a:t>Integer.MIN_VALUE</a:t>
-            </a:r>
-            <a:endParaRPr lang="en-US" dirty="0"/>
-          </a:p>
-          <a:p>
-            <a:r>
-              <a:rPr lang="en-US" dirty="0"/>
-              <a:t>long (</a:t>
-            </a:r>
-            <a:r>
-              <a:rPr lang="en-US" dirty="0" smtClean="0"/>
-              <a:t>2</a:t>
-            </a:r>
-            <a:r>
-              <a:rPr lang="en-US" baseline="30000" dirty="0" smtClean="0"/>
-              <a:t>63</a:t>
-            </a:r>
-            <a:r>
-              <a:rPr lang="en-US" dirty="0" smtClean="0"/>
-              <a:t>) </a:t>
-            </a:r>
-            <a:r>
-              <a:rPr lang="en-US" dirty="0"/>
-              <a:t>=&gt; </a:t>
-            </a:r>
-            <a:r>
-              <a:rPr lang="en-US" dirty="0" err="1" smtClean="0"/>
-              <a:t>Long.MIN_VALUE</a:t>
-            </a:r>
-            <a:endParaRPr lang="en-US" dirty="0" smtClean="0"/>
-          </a:p>
-          <a:p>
-            <a:r>
-              <a:rPr lang="en-US" dirty="0" smtClean="0"/>
-              <a:t>Byte (2</a:t>
-            </a:r>
-            <a:r>
-              <a:rPr lang="en-US" baseline="30000" dirty="0" smtClean="0"/>
-              <a:t>7</a:t>
-            </a:r>
-            <a:r>
-              <a:rPr lang="en-US" dirty="0" smtClean="0"/>
-              <a:t>) </a:t>
-            </a:r>
-            <a:r>
-              <a:rPr lang="en-US" dirty="0"/>
-              <a:t>=&gt; </a:t>
-            </a:r>
-            <a:r>
-              <a:rPr lang="en-US" dirty="0" err="1" smtClean="0"/>
-              <a:t>Byte.MIN_VALUE</a:t>
-            </a:r>
-            <a:endParaRPr lang="en-US" dirty="0"/>
-          </a:p>
-          <a:p>
-            <a:endParaRPr lang="en-US" dirty="0"/>
-          </a:p>
-          <a:p>
-            <a:pPr marL="0" indent="0" algn="ctr">
-              <a:buNone/>
-            </a:pPr>
-            <a:r>
-              <a:rPr lang="en-US" dirty="0">
-                <a:solidFill>
-                  <a:schemeClr val="bg2">
-                    <a:lumMod val="40000"/>
-                    <a:lumOff val="60000"/>
-                  </a:schemeClr>
-                </a:solidFill>
-              </a:rPr>
-              <a:t>Why?  </a:t>
-            </a:r>
-          </a:p>
-          <a:p>
-            <a:pPr marL="0" indent="0" algn="ctr">
-              <a:buNone/>
-            </a:pPr>
-            <a:r>
-              <a:rPr lang="en-US" dirty="0">
-                <a:solidFill>
-                  <a:schemeClr val="bg2">
-                    <a:lumMod val="40000"/>
-                    <a:lumOff val="60000"/>
-                  </a:schemeClr>
-                </a:solidFill>
-              </a:rPr>
-              <a:t>Because </a:t>
-            </a:r>
-            <a:r>
-              <a:rPr lang="en-US" dirty="0" smtClean="0">
-                <a:solidFill>
-                  <a:schemeClr val="bg2">
-                    <a:lumMod val="40000"/>
-                    <a:lumOff val="60000"/>
-                  </a:schemeClr>
-                </a:solidFill>
-              </a:rPr>
-              <a:t>we still use one </a:t>
-            </a:r>
-            <a:r>
-              <a:rPr lang="en-US" dirty="0">
-                <a:solidFill>
-                  <a:schemeClr val="bg2">
-                    <a:lumMod val="40000"/>
-                    <a:lumOff val="60000"/>
-                  </a:schemeClr>
-                </a:solidFill>
-              </a:rPr>
-              <a:t>bit </a:t>
-            </a:r>
-            <a:r>
-              <a:rPr lang="en-US" dirty="0" smtClean="0">
-                <a:solidFill>
-                  <a:schemeClr val="bg2">
-                    <a:lumMod val="40000"/>
-                    <a:lumOff val="60000"/>
-                  </a:schemeClr>
-                </a:solidFill>
-              </a:rPr>
-              <a:t>for </a:t>
-            </a:r>
-            <a:r>
-              <a:rPr lang="en-US" dirty="0">
-                <a:solidFill>
-                  <a:schemeClr val="bg2">
-                    <a:lumMod val="40000"/>
-                    <a:lumOff val="60000"/>
-                  </a:schemeClr>
-                </a:solidFill>
-              </a:rPr>
-              <a:t>the sign.</a:t>
-            </a:r>
-          </a:p>
-          <a:p>
-            <a:endParaRPr lang="en-US" dirty="0"/>
+              <a:rPr lang="en-CA" dirty="0" smtClean="0"/>
+              <a:t>Negative Binary Numbers</a:t>
+            </a:r>
+            <a:endParaRPr lang="en-CA" dirty="0"/>
+          </a:p>
+        </p:txBody>
+      </p:sp>
+      <p:sp>
+        <p:nvSpPr>
+          <p:cNvPr id="3" name="Content Placeholder 2"/>
+          <p:cNvSpPr>
+            <a:spLocks noGrp="1"/>
+          </p:cNvSpPr>
+          <p:nvPr>
+            <p:ph idx="1"/>
+          </p:nvPr>
+        </p:nvSpPr>
+        <p:spPr/>
+        <p:txBody>
+          <a:bodyPr/>
+          <a:lstStyle/>
+          <a:p>
+            <a:r>
+              <a:rPr lang="en-CA" dirty="0" smtClean="0"/>
+              <a:t>When working with Negative Numbers – we live in bizarro world and need to do it a bit differently.</a:t>
+            </a:r>
+          </a:p>
+          <a:p>
+            <a:endParaRPr lang="en-CA" dirty="0"/>
+          </a:p>
+          <a:p>
+            <a:endParaRPr lang="en-CA" dirty="0"/>
+          </a:p>
+          <a:p>
+            <a:r>
+              <a:rPr lang="en-CA" dirty="0" smtClean="0"/>
+              <a:t>That means 10000000 is actually the number -128 because and 10000001 is     -127.</a:t>
+            </a:r>
+            <a:endParaRPr lang="en-CA" dirty="0"/>
           </a:p>
         </p:txBody>
       </p:sp>
     </p:spTree>
     <p:extLst>
       <p:ext uri="{BB962C8B-B14F-4D97-AF65-F5344CB8AC3E}">
-        <p14:creationId xmlns:p14="http://schemas.microsoft.com/office/powerpoint/2010/main" val="3751402489"/>
+        <p14:creationId xmlns:p14="http://schemas.microsoft.com/office/powerpoint/2010/main" val="758400020"/>
       </p:ext>
     </p:extLst>
   </p:cSld>
@@ -5244,10 +5080,10 @@
           <a:lstStyle/>
           <a:p>
             <a:r>
-              <a:rPr lang="en-US" dirty="0" smtClean="0"/>
-              <a:t>Floating Point Numbers</a:t>
-            </a:r>
-            <a:endParaRPr lang="en-US" dirty="0"/>
+              <a:rPr lang="en-CA" dirty="0" smtClean="0"/>
+              <a:t>Convert to Decimal</a:t>
+            </a:r>
+            <a:endParaRPr lang="en-CA" dirty="0"/>
           </a:p>
         </p:txBody>
       </p:sp>
@@ -5267,74 +5103,36 @@
           <a:lstStyle/>
           <a:p>
             <a:r>
-              <a:rPr lang="en-US" dirty="0" smtClean="0"/>
-              <a:t>Float uses four bytes</a:t>
-            </a:r>
-          </a:p>
-          <a:p>
-            <a:endParaRPr lang="en-US" dirty="0"/>
-          </a:p>
-          <a:p>
-            <a:r>
-              <a:rPr lang="en-US" dirty="0" smtClean="0"/>
-              <a:t>Double uses eight bytes</a:t>
-            </a:r>
-          </a:p>
-          <a:p>
-            <a:endParaRPr lang="en-US" dirty="0"/>
-          </a:p>
-          <a:p>
-            <a:r>
-              <a:rPr lang="en-US" dirty="0" smtClean="0"/>
-              <a:t>Does not throw Exceptions but returns </a:t>
-            </a:r>
-            <a:r>
-              <a:rPr lang="en-US" dirty="0" err="1" smtClean="0">
-                <a:solidFill>
-                  <a:schemeClr val="accent2">
-                    <a:lumMod val="60000"/>
-                    <a:lumOff val="40000"/>
-                  </a:schemeClr>
-                </a:solidFill>
-              </a:rPr>
-              <a:t>NaN</a:t>
-            </a:r>
-            <a:r>
-              <a:rPr lang="en-US" dirty="0" smtClean="0">
-                <a:solidFill>
-                  <a:schemeClr val="accent2">
-                    <a:lumMod val="60000"/>
-                    <a:lumOff val="40000"/>
-                  </a:schemeClr>
-                </a:solidFill>
-              </a:rPr>
-              <a:t> or Infinity or -Infinity </a:t>
-            </a:r>
-            <a:r>
-              <a:rPr lang="en-US" dirty="0" smtClean="0"/>
-              <a:t>where integers will throw exceptions.</a:t>
-            </a:r>
-            <a:endParaRPr lang="en-US" dirty="0"/>
+              <a:rPr lang="en-CA" dirty="0" smtClean="0"/>
+              <a:t>An 8 bit number with a sign bit take the seven extra bits and subtract from 128:</a:t>
+            </a:r>
+          </a:p>
+          <a:p>
+            <a:endParaRPr lang="en-CA" dirty="0"/>
+          </a:p>
+          <a:p>
+            <a:r>
+              <a:rPr lang="en-CA" dirty="0" smtClean="0"/>
+              <a:t>11001111</a:t>
+            </a:r>
+            <a:r>
+              <a:rPr lang="en-CA" baseline="-25000" dirty="0" smtClean="0"/>
+              <a:t>bin</a:t>
+            </a:r>
+            <a:endParaRPr lang="en-CA" baseline="-25000" dirty="0"/>
           </a:p>
         </p:txBody>
       </p:sp>
     </p:spTree>
     <p:extLst>
       <p:ext uri="{BB962C8B-B14F-4D97-AF65-F5344CB8AC3E}">
-        <p14:creationId xmlns:p14="http://schemas.microsoft.com/office/powerpoint/2010/main" val="889339120"/>
+        <p14:creationId xmlns:p14="http://schemas.microsoft.com/office/powerpoint/2010/main" val="2635237895"/>
       </p:ext>
     </p:extLst>
   </p:cSld>
   <p:clrMapOvr>
     <a:masterClrMapping/>
   </p:clrMapOvr>
-  <p:timing>
-    <p:tnLst>
-      <p:par>
-        <p:cTn id="1" dur="indefinite" restart="never" nodeType="tmRoot"/>
-      </p:par>
-    </p:tnLst>
-  </p:timing>
 </p:sld>
 </file>
 
@@ -5367,72 +5165,218 @@
         </p:nvSpPr>
         <p:spPr/>
         <p:txBody>
+          <a:bodyPr>
+            <a:normAutofit fontScale="90000"/>
+          </a:bodyPr>
+          <a:lstStyle/>
+          <a:p>
+            <a:r>
+              <a:rPr lang="en-US" dirty="0" smtClean="0"/>
+              <a:t>Smallest Possible Integer Values</a:t>
+            </a:r>
+            <a:endParaRPr lang="en-US" dirty="0"/>
+          </a:p>
+        </p:txBody>
+      </p:sp>
+      <p:sp>
+        <p:nvSpPr>
+          <p:cNvPr id="3" name="Content Placeholder 2"/>
+          <p:cNvSpPr>
+            <a:spLocks noGrp="1"/>
+          </p:cNvSpPr>
+          <p:nvPr>
+            <p:ph idx="1"/>
+          </p:nvPr>
+        </p:nvSpPr>
+        <p:spPr/>
+        <p:txBody>
           <a:bodyPr/>
           <a:lstStyle/>
           <a:p>
             <a:r>
-              <a:rPr lang="en-US" dirty="0" smtClean="0"/>
-              <a:t>Hexadecimal Numbers</a:t>
+              <a:rPr lang="en-US" dirty="0"/>
+              <a:t>short (</a:t>
+            </a:r>
+            <a:r>
+              <a:rPr lang="en-US" dirty="0" smtClean="0"/>
+              <a:t>2</a:t>
+            </a:r>
+            <a:r>
+              <a:rPr lang="en-US" baseline="30000" dirty="0" smtClean="0"/>
+              <a:t>15</a:t>
+            </a:r>
+            <a:r>
+              <a:rPr lang="en-US" dirty="0" smtClean="0"/>
+              <a:t>) </a:t>
+            </a:r>
+            <a:r>
+              <a:rPr lang="en-US" dirty="0"/>
+              <a:t>=&gt; </a:t>
+            </a:r>
+            <a:r>
+              <a:rPr lang="en-US" dirty="0" err="1" smtClean="0"/>
+              <a:t>Short.MIN_VALUE</a:t>
             </a:r>
             <a:endParaRPr lang="en-US" dirty="0"/>
           </a:p>
-        </p:txBody>
-      </p:sp>
-      <p:sp>
-        <p:nvSpPr>
-          <p:cNvPr id="3" name="Content Placeholder 2"/>
-          <p:cNvSpPr>
-            <a:spLocks noGrp="1"/>
-          </p:cNvSpPr>
-          <p:nvPr>
-            <p:ph idx="1"/>
-          </p:nvPr>
-        </p:nvSpPr>
-        <p:spPr/>
-        <p:txBody>
-          <a:bodyPr/>
-          <a:lstStyle/>
-          <a:p>
-            <a:r>
-              <a:rPr lang="en-US" dirty="0" smtClean="0"/>
-              <a:t>Uses base (radix) 16</a:t>
-            </a:r>
-          </a:p>
-          <a:p>
-            <a:r>
-              <a:rPr lang="en-US" dirty="0" smtClean="0"/>
-              <a:t>Uses number 0-9, A-F</a:t>
-            </a:r>
-          </a:p>
-          <a:p>
-            <a:pPr lvl="1"/>
-            <a:r>
-              <a:rPr lang="en-US" dirty="0" smtClean="0"/>
-              <a:t>A is 10 and F is 16</a:t>
-            </a:r>
-          </a:p>
-          <a:p>
-            <a:pPr lvl="1"/>
-            <a:r>
-              <a:rPr lang="en-US" dirty="0" smtClean="0"/>
-              <a:t>Use 0x to represent hex in Java</a:t>
-            </a:r>
-          </a:p>
-          <a:p>
-            <a:pPr lvl="1"/>
-            <a:r>
-              <a:rPr lang="en-US" dirty="0" smtClean="0"/>
-              <a:t>Compact and use less digits then other systems</a:t>
-            </a:r>
-          </a:p>
-          <a:p>
-            <a:pPr lvl="1"/>
+          <a:p>
+            <a:r>
+              <a:rPr lang="en-US" dirty="0" err="1"/>
+              <a:t>int</a:t>
+            </a:r>
+            <a:r>
+              <a:rPr lang="en-US" dirty="0"/>
+              <a:t> (</a:t>
+            </a:r>
+            <a:r>
+              <a:rPr lang="en-US" dirty="0" smtClean="0"/>
+              <a:t>2</a:t>
+            </a:r>
+            <a:r>
+              <a:rPr lang="en-US" baseline="30000" dirty="0" smtClean="0"/>
+              <a:t>31</a:t>
+            </a:r>
+            <a:r>
+              <a:rPr lang="en-US" dirty="0" smtClean="0"/>
+              <a:t>) </a:t>
+            </a:r>
+            <a:r>
+              <a:rPr lang="en-US" dirty="0"/>
+              <a:t>=&gt; </a:t>
+            </a:r>
+            <a:r>
+              <a:rPr lang="en-US" dirty="0" err="1" smtClean="0"/>
+              <a:t>Integer.MIN_VALUE</a:t>
+            </a:r>
+            <a:endParaRPr lang="en-US" dirty="0"/>
+          </a:p>
+          <a:p>
+            <a:r>
+              <a:rPr lang="en-US" dirty="0"/>
+              <a:t>long (</a:t>
+            </a:r>
+            <a:r>
+              <a:rPr lang="en-US" dirty="0" smtClean="0"/>
+              <a:t>2</a:t>
+            </a:r>
+            <a:r>
+              <a:rPr lang="en-US" baseline="30000" dirty="0" smtClean="0"/>
+              <a:t>63</a:t>
+            </a:r>
+            <a:r>
+              <a:rPr lang="en-US" dirty="0" smtClean="0"/>
+              <a:t>) </a:t>
+            </a:r>
+            <a:r>
+              <a:rPr lang="en-US" dirty="0"/>
+              <a:t>=&gt; </a:t>
+            </a:r>
+            <a:r>
+              <a:rPr lang="en-US" dirty="0" err="1" smtClean="0"/>
+              <a:t>Long.MIN_VALUE</a:t>
+            </a:r>
             <a:endParaRPr lang="en-US" dirty="0" smtClean="0"/>
           </a:p>
           <a:p>
             <a:r>
               <a:rPr lang="en-US" dirty="0" smtClean="0"/>
-              <a:t>Example: 0x2B2FA1 (represents a specific color as well)</a:t>
+              <a:t>Byte (2</a:t>
+            </a:r>
+            <a:r>
+              <a:rPr lang="en-US" baseline="30000" dirty="0" smtClean="0"/>
+              <a:t>7</a:t>
+            </a:r>
+            <a:r>
+              <a:rPr lang="en-US" dirty="0" smtClean="0"/>
+              <a:t>) </a:t>
+            </a:r>
+            <a:r>
+              <a:rPr lang="en-US" dirty="0"/>
+              <a:t>=&gt; </a:t>
+            </a:r>
+            <a:r>
+              <a:rPr lang="en-US" dirty="0" err="1" smtClean="0"/>
+              <a:t>Byte.MIN_VALUE</a:t>
+            </a:r>
+            <a:endParaRPr lang="en-US" dirty="0"/>
+          </a:p>
+          <a:p>
+            <a:endParaRPr lang="en-US" dirty="0"/>
+          </a:p>
+          <a:p>
+            <a:pPr marL="0" indent="0" algn="ctr">
+              <a:buNone/>
+            </a:pPr>
+            <a:r>
+              <a:rPr lang="en-US" dirty="0">
+                <a:solidFill>
+                  <a:schemeClr val="bg2">
+                    <a:lumMod val="40000"/>
+                    <a:lumOff val="60000"/>
+                  </a:schemeClr>
+                </a:solidFill>
+              </a:rPr>
+              <a:t>Why?  </a:t>
+            </a:r>
+          </a:p>
+          <a:p>
+            <a:pPr marL="0" indent="0" algn="ctr">
+              <a:buNone/>
+            </a:pPr>
+            <a:r>
+              <a:rPr lang="en-US" dirty="0">
+                <a:solidFill>
+                  <a:schemeClr val="bg2">
+                    <a:lumMod val="40000"/>
+                    <a:lumOff val="60000"/>
+                  </a:schemeClr>
+                </a:solidFill>
+              </a:rPr>
+              <a:t>Because </a:t>
+            </a:r>
+            <a:r>
+              <a:rPr lang="en-US" dirty="0" smtClean="0">
+                <a:solidFill>
+                  <a:schemeClr val="bg2">
+                    <a:lumMod val="40000"/>
+                    <a:lumOff val="60000"/>
+                  </a:schemeClr>
+                </a:solidFill>
+              </a:rPr>
+              <a:t>we still use one </a:t>
+            </a:r>
+            <a:r>
+              <a:rPr lang="en-US" dirty="0">
+                <a:solidFill>
+                  <a:schemeClr val="bg2">
+                    <a:lumMod val="40000"/>
+                    <a:lumOff val="60000"/>
+                  </a:schemeClr>
+                </a:solidFill>
+              </a:rPr>
+              <a:t>bit </a:t>
+            </a:r>
+            <a:r>
+              <a:rPr lang="en-US" dirty="0" smtClean="0">
+                <a:solidFill>
+                  <a:schemeClr val="bg2">
+                    <a:lumMod val="40000"/>
+                    <a:lumOff val="60000"/>
+                  </a:schemeClr>
+                </a:solidFill>
+              </a:rPr>
+              <a:t>for </a:t>
+            </a:r>
+            <a:r>
+              <a:rPr lang="en-US" dirty="0">
+                <a:solidFill>
+                  <a:schemeClr val="bg2">
+                    <a:lumMod val="40000"/>
+                    <a:lumOff val="60000"/>
+                  </a:schemeClr>
+                </a:solidFill>
+              </a:rPr>
+              <a:t>the sign.</a:t>
             </a:r>
           </a:p>
           <a:p>
@@ -5443,7 +5387,7 @@
     </p:spTree>
     <p:extLst>
       <p:ext uri="{BB962C8B-B14F-4D97-AF65-F5344CB8AC3E}">
-        <p14:creationId xmlns:p14="http://schemas.microsoft.com/office/powerpoint/2010/main" val="1009526611"/>
+        <p14:creationId xmlns:p14="http://schemas.microsoft.com/office/powerpoint/2010/main" val="3751402489"/>
       </p:ext>
     </p:extLst>
   </p:cSld>
@@ -5494,7 +5438,7 @@
           <a:p>
             <a:r>
               <a:rPr lang="en-US" dirty="0" smtClean="0"/>
-              <a:t>Example</a:t>
+              <a:t>Floating Point Numbers</a:t>
             </a:r>
             <a:endParaRPr lang="en-US" dirty="0"/>
           </a:p>
@@ -5517,7 +5461,51 @@
           <a:p>
             <a:r>
               <a:rPr lang="en-US" dirty="0" smtClean="0"/>
-              <a:t>What number is 0xE32A?</a:t>
+              <a:t>Float uses four bytes</a:t>
+            </a:r>
+          </a:p>
+          <a:p>
+            <a:endParaRPr lang="en-US" dirty="0"/>
+          </a:p>
+          <a:p>
+            <a:r>
+              <a:rPr lang="en-US" dirty="0" smtClean="0"/>
+              <a:t>Double uses eight bytes</a:t>
+            </a:r>
+          </a:p>
+          <a:p>
+            <a:endParaRPr lang="en-US" dirty="0"/>
+          </a:p>
+          <a:p>
+            <a:r>
+              <a:rPr lang="en-US" dirty="0" smtClean="0"/>
+              <a:t>Does not throw Exceptions but returns </a:t>
+            </a:r>
+            <a:r>
+              <a:rPr lang="en-US" dirty="0" err="1" smtClean="0">
+                <a:solidFill>
+                  <a:schemeClr val="accent2">
+                    <a:lumMod val="60000"/>
+                    <a:lumOff val="40000"/>
+                  </a:schemeClr>
+                </a:solidFill>
+              </a:rPr>
+              <a:t>NaN</a:t>
+            </a:r>
+            <a:r>
+              <a:rPr lang="en-US" dirty="0" smtClean="0">
+                <a:solidFill>
+                  <a:schemeClr val="accent2">
+                    <a:lumMod val="60000"/>
+                    <a:lumOff val="40000"/>
+                  </a:schemeClr>
+                </a:solidFill>
+              </a:rPr>
+              <a:t> or Infinity or -Infinity </a:t>
+            </a:r>
+            <a:r>
+              <a:rPr lang="en-US" dirty="0" smtClean="0"/>
+              <a:t>where integers will throw exceptions.</a:t>
             </a:r>
             <a:endParaRPr lang="en-US" dirty="0"/>
           </a:p>
@@ -5526,7 +5514,7 @@
     </p:spTree>
     <p:extLst>
       <p:ext uri="{BB962C8B-B14F-4D97-AF65-F5344CB8AC3E}">
-        <p14:creationId xmlns:p14="http://schemas.microsoft.com/office/powerpoint/2010/main" val="2069498077"/>
+        <p14:creationId xmlns:p14="http://schemas.microsoft.com/office/powerpoint/2010/main" val="889339120"/>
       </p:ext>
     </p:extLst>
   </p:cSld>
@@ -5577,7 +5565,7 @@
           <a:p>
             <a:r>
               <a:rPr lang="en-US" dirty="0" smtClean="0"/>
-              <a:t>Example</a:t>
+              <a:t>Hexadecimal Numbers</a:t>
             </a:r>
             <a:endParaRPr lang="en-US" dirty="0"/>
           </a:p>
@@ -5600,16 +5588,47 @@
           <a:p>
             <a:r>
               <a:rPr lang="en-US" dirty="0" smtClean="0"/>
-              <a:t>What number is 3EF20</a:t>
-            </a:r>
-            <a:r>
-              <a:rPr lang="en-US" baseline="-25000" dirty="0" smtClean="0"/>
-              <a:t>hex</a:t>
-            </a:r>
-            <a:r>
-              <a:rPr lang="en-US" dirty="0" smtClean="0"/>
-              <a:t>?</a:t>
-            </a:r>
+              <a:t>Uses base (radix) 16</a:t>
+            </a:r>
+          </a:p>
+          <a:p>
+            <a:r>
+              <a:rPr lang="en-US" dirty="0" smtClean="0"/>
+              <a:t>Uses number 0-9, A-F</a:t>
+            </a:r>
+          </a:p>
+          <a:p>
+            <a:pPr lvl="1"/>
+            <a:r>
+              <a:rPr lang="en-US" dirty="0" smtClean="0"/>
+              <a:t>A is 10 and F is 16</a:t>
+            </a:r>
+          </a:p>
+          <a:p>
+            <a:pPr lvl="1"/>
+            <a:r>
+              <a:rPr lang="en-US" dirty="0" smtClean="0"/>
+              <a:t>Use 0x to represent hex in Java</a:t>
+            </a:r>
+          </a:p>
+          <a:p>
+            <a:pPr lvl="1"/>
+            <a:r>
+              <a:rPr lang="en-US" dirty="0" smtClean="0"/>
+              <a:t>Compact and use less digits then other systems</a:t>
+            </a:r>
+          </a:p>
+          <a:p>
+            <a:pPr lvl="1"/>
+            <a:endParaRPr lang="en-US" dirty="0" smtClean="0"/>
+          </a:p>
+          <a:p>
+            <a:r>
+              <a:rPr lang="en-US" dirty="0" smtClean="0"/>
+              <a:t>Example: 0x2B2FA1 (represents a specific color as well)</a:t>
+            </a:r>
+          </a:p>
+          <a:p>
             <a:endParaRPr lang="en-US" dirty="0"/>
           </a:p>
         </p:txBody>
@@ -5617,7 +5636,7 @@
     </p:spTree>
     <p:extLst>
       <p:ext uri="{BB962C8B-B14F-4D97-AF65-F5344CB8AC3E}">
-        <p14:creationId xmlns:p14="http://schemas.microsoft.com/office/powerpoint/2010/main" val="1968143374"/>
+        <p14:creationId xmlns:p14="http://schemas.microsoft.com/office/powerpoint/2010/main" val="1009526611"/>
       </p:ext>
     </p:extLst>
   </p:cSld>
@@ -5668,7 +5687,7 @@
           <a:p>
             <a:r>
               <a:rPr lang="en-US" dirty="0" smtClean="0"/>
-              <a:t>Hex and Binary Relationship</a:t>
+              <a:t>Example</a:t>
             </a:r>
             <a:endParaRPr lang="en-US" dirty="0"/>
           </a:p>
@@ -5691,83 +5710,8 @@
           <a:p>
             <a:r>
               <a:rPr lang="en-US" dirty="0" smtClean="0"/>
-              <a:t>Every hex number converts to four bits.</a:t>
-            </a:r>
-          </a:p>
-          <a:p>
-            <a:pPr lvl="1"/>
-            <a:r>
-              <a:rPr lang="en-US" dirty="0" smtClean="0"/>
-              <a:t>Converts very conveniently to binary and back.</a:t>
-            </a:r>
-          </a:p>
-          <a:p>
-            <a:pPr lvl="1"/>
-            <a:endParaRPr lang="en-US" dirty="0"/>
-          </a:p>
-          <a:p>
-            <a:r>
-              <a:rPr lang="en-US" dirty="0" smtClean="0"/>
-              <a:t>Remember 2</a:t>
-            </a:r>
-            <a:r>
-              <a:rPr lang="en-US" baseline="30000" dirty="0" smtClean="0"/>
-              <a:t>4</a:t>
-            </a:r>
-            <a:r>
-              <a:rPr lang="en-US" dirty="0" smtClean="0"/>
-              <a:t> = 16 that is a bit number</a:t>
-            </a:r>
-          </a:p>
-          <a:p>
-            <a:endParaRPr lang="en-US" dirty="0"/>
-          </a:p>
-          <a:p>
-            <a:r>
-              <a:rPr lang="en-US" dirty="0" smtClean="0"/>
-              <a:t>5</a:t>
-            </a:r>
-            <a:r>
-              <a:rPr lang="en-US" baseline="-25000" dirty="0" smtClean="0"/>
-              <a:t>hex</a:t>
-            </a:r>
-            <a:r>
-              <a:rPr lang="en-US" dirty="0" smtClean="0"/>
-              <a:t> = 0101</a:t>
-            </a:r>
-            <a:r>
-              <a:rPr lang="en-US" baseline="-25000" dirty="0" smtClean="0"/>
-              <a:t>bin</a:t>
-            </a:r>
-            <a:r>
-              <a:rPr lang="en-US" dirty="0" smtClean="0"/>
-              <a:t>     and </a:t>
-            </a:r>
-            <a:r>
-              <a:rPr lang="en-US" dirty="0" err="1" smtClean="0"/>
-              <a:t>F</a:t>
-            </a:r>
-            <a:r>
-              <a:rPr lang="en-US" baseline="-25000" dirty="0" err="1" smtClean="0"/>
-              <a:t>hex</a:t>
-            </a:r>
-            <a:r>
-              <a:rPr lang="en-US" dirty="0" smtClean="0"/>
-              <a:t> = 1111</a:t>
-            </a:r>
-            <a:r>
-              <a:rPr lang="en-US" baseline="-25000" dirty="0" smtClean="0"/>
-              <a:t>bin</a:t>
-            </a:r>
-          </a:p>
-          <a:p>
-            <a:pPr lvl="1"/>
-            <a:endParaRPr lang="en-US" dirty="0" smtClean="0"/>
-          </a:p>
-          <a:p>
-            <a:endParaRPr lang="en-US" dirty="0"/>
-          </a:p>
-          <a:p>
+              <a:t>What number is 0xE32A?</a:t>
+            </a:r>
             <a:endParaRPr lang="en-US" dirty="0"/>
           </a:p>
         </p:txBody>
@@ -5775,7 +5719,7 @@
     </p:spTree>
     <p:extLst>
       <p:ext uri="{BB962C8B-B14F-4D97-AF65-F5344CB8AC3E}">
-        <p14:creationId xmlns:p14="http://schemas.microsoft.com/office/powerpoint/2010/main" val="1468678317"/>
+        <p14:creationId xmlns:p14="http://schemas.microsoft.com/office/powerpoint/2010/main" val="2069498077"/>
       </p:ext>
     </p:extLst>
   </p:cSld>
@@ -5849,15 +5793,15 @@
           <a:p>
             <a:r>
               <a:rPr lang="en-US" dirty="0" smtClean="0"/>
-              <a:t>Convert 11011111</a:t>
+              <a:t>What number is 3EF20</a:t>
             </a:r>
             <a:r>
               <a:rPr lang="en-US" baseline="-25000" dirty="0" smtClean="0"/>
-              <a:t>bin</a:t>
-            </a:r>
-            <a:r>
-              <a:rPr lang="en-US" dirty="0" smtClean="0"/>
-              <a:t> to its base 16 representation.</a:t>
+              <a:t>hex</a:t>
+            </a:r>
+            <a:r>
+              <a:rPr lang="en-US" dirty="0" smtClean="0"/>
+              <a:t>?</a:t>
             </a:r>
             <a:endParaRPr lang="en-US" dirty="0"/>
           </a:p>
@@ -5866,13 +5810,20 @@
     </p:spTree>
     <p:extLst>
       <p:ext uri="{BB962C8B-B14F-4D97-AF65-F5344CB8AC3E}">
-        <p14:creationId xmlns:p14="http://schemas.microsoft.com/office/powerpoint/2010/main" val="710032533"/>
+        <p14:creationId xmlns:p14="http://schemas.microsoft.com/office/powerpoint/2010/main" val="1968143374"/>
       </p:ext>
     </p:extLst>
   </p:cSld>
   <p:clrMapOvr>
     <a:masterClrMapping/>
   </p:clrMapOvr>
+  <p:timing>
+    <p:tnLst>
+      <p:par>
+        <p:cTn id="1" dur="indefinite" restart="never" nodeType="tmRoot"/>
+      </p:par>
+    </p:tnLst>
+  </p:timing>
 </p:sld>
 </file>
 
@@ -5910,7 +5861,7 @@
           <a:p>
             <a:r>
               <a:rPr lang="en-US" dirty="0" smtClean="0"/>
-              <a:t>Example</a:t>
+              <a:t>Hex and Binary Relationship</a:t>
             </a:r>
             <a:endParaRPr lang="en-US" dirty="0"/>
           </a:p>
@@ -5933,8 +5884,83 @@
           <a:p>
             <a:r>
               <a:rPr lang="en-US" dirty="0" smtClean="0"/>
-              <a:t>Convert 0xF3E to its binary equivalent.</a:t>
-            </a:r>
+              <a:t>Every hex number converts to four bits.</a:t>
+            </a:r>
+          </a:p>
+          <a:p>
+            <a:pPr lvl="1"/>
+            <a:r>
+              <a:rPr lang="en-US" dirty="0" smtClean="0"/>
+              <a:t>Converts very conveniently to binary and back.</a:t>
+            </a:r>
+          </a:p>
+          <a:p>
+            <a:pPr lvl="1"/>
+            <a:endParaRPr lang="en-US" dirty="0"/>
+          </a:p>
+          <a:p>
+            <a:r>
+              <a:rPr lang="en-US" dirty="0" smtClean="0"/>
+              <a:t>Remember 2</a:t>
+            </a:r>
+            <a:r>
+              <a:rPr lang="en-US" baseline="30000" dirty="0" smtClean="0"/>
+              <a:t>4</a:t>
+            </a:r>
+            <a:r>
+              <a:rPr lang="en-US" dirty="0" smtClean="0"/>
+              <a:t> = 16 that is a bit number</a:t>
+            </a:r>
+          </a:p>
+          <a:p>
+            <a:endParaRPr lang="en-US" dirty="0"/>
+          </a:p>
+          <a:p>
+            <a:r>
+              <a:rPr lang="en-US" dirty="0" smtClean="0"/>
+              <a:t>5</a:t>
+            </a:r>
+            <a:r>
+              <a:rPr lang="en-US" baseline="-25000" dirty="0" smtClean="0"/>
+              <a:t>hex</a:t>
+            </a:r>
+            <a:r>
+              <a:rPr lang="en-US" dirty="0" smtClean="0"/>
+              <a:t> = 0101</a:t>
+            </a:r>
+            <a:r>
+              <a:rPr lang="en-US" baseline="-25000" dirty="0" smtClean="0"/>
+              <a:t>bin</a:t>
+            </a:r>
+            <a:r>
+              <a:rPr lang="en-US" dirty="0" smtClean="0"/>
+              <a:t>     and </a:t>
+            </a:r>
+            <a:r>
+              <a:rPr lang="en-US" dirty="0" err="1" smtClean="0"/>
+              <a:t>F</a:t>
+            </a:r>
+            <a:r>
+              <a:rPr lang="en-US" baseline="-25000" dirty="0" err="1" smtClean="0"/>
+              <a:t>hex</a:t>
+            </a:r>
+            <a:r>
+              <a:rPr lang="en-US" dirty="0" smtClean="0"/>
+              <a:t> = 1111</a:t>
+            </a:r>
+            <a:r>
+              <a:rPr lang="en-US" baseline="-25000" dirty="0" smtClean="0"/>
+              <a:t>bin</a:t>
+            </a:r>
+          </a:p>
+          <a:p>
+            <a:pPr lvl="1"/>
+            <a:endParaRPr lang="en-US" dirty="0" smtClean="0"/>
+          </a:p>
+          <a:p>
+            <a:endParaRPr lang="en-US" dirty="0"/>
+          </a:p>
+          <a:p>
             <a:endParaRPr lang="en-US" dirty="0"/>
           </a:p>
         </p:txBody>
@@ -5942,13 +5968,20 @@
     </p:spTree>
     <p:extLst>
       <p:ext uri="{BB962C8B-B14F-4D97-AF65-F5344CB8AC3E}">
-        <p14:creationId xmlns:p14="http://schemas.microsoft.com/office/powerpoint/2010/main" val="3666127741"/>
+        <p14:creationId xmlns:p14="http://schemas.microsoft.com/office/powerpoint/2010/main" val="1468678317"/>
       </p:ext>
     </p:extLst>
   </p:cSld>
   <p:clrMapOvr>
     <a:masterClrMapping/>
   </p:clrMapOvr>
+  <p:timing>
+    <p:tnLst>
+      <p:par>
+        <p:cTn id="1" dur="indefinite" restart="never" nodeType="tmRoot"/>
+      </p:par>
+    </p:tnLst>
+  </p:timing>
 </p:sld>
 </file>
 
@@ -6094,6 +6127,166 @@
           <a:lstStyle/>
           <a:p>
             <a:r>
+              <a:rPr lang="en-US" dirty="0" smtClean="0"/>
+              <a:t>Example</a:t>
+            </a:r>
+            <a:endParaRPr lang="en-US" dirty="0"/>
+          </a:p>
+        </p:txBody>
+      </p:sp>
+      <p:sp>
+        <p:nvSpPr>
+          <p:cNvPr id="3" name="Content Placeholder 2"/>
+          <p:cNvSpPr>
+            <a:spLocks noGrp="1"/>
+          </p:cNvSpPr>
+          <p:nvPr>
+            <p:ph idx="1"/>
+          </p:nvPr>
+        </p:nvSpPr>
+        <p:spPr/>
+        <p:txBody>
+          <a:bodyPr/>
+          <a:lstStyle/>
+          <a:p>
+            <a:r>
+              <a:rPr lang="en-US" dirty="0" smtClean="0"/>
+              <a:t>Convert 11011111</a:t>
+            </a:r>
+            <a:r>
+              <a:rPr lang="en-US" baseline="-25000" dirty="0" smtClean="0"/>
+              <a:t>bin</a:t>
+            </a:r>
+            <a:r>
+              <a:rPr lang="en-US" dirty="0" smtClean="0"/>
+              <a:t> to its base 16 representation.</a:t>
+            </a:r>
+            <a:endParaRPr lang="en-US" dirty="0"/>
+          </a:p>
+        </p:txBody>
+      </p:sp>
+    </p:spTree>
+    <p:extLst>
+      <p:ext uri="{BB962C8B-B14F-4D97-AF65-F5344CB8AC3E}">
+        <p14:creationId xmlns:p14="http://schemas.microsoft.com/office/powerpoint/2010/main" val="710032533"/>
+      </p:ext>
+    </p:extLst>
+  </p:cSld>
+  <p:clrMapOvr>
+    <a:masterClrMapping/>
+  </p:clrMapOvr>
+</p:sld>
+</file>
+
+<file path=ppt/slides/slide21.xml><?xml version="1.0" encoding="utf-8"?>
+<p:sld xmlns:a="http://schemas.openxmlformats.org/drawingml/2006/main" xmlns:r="http://schemas.openxmlformats.org/officeDocument/2006/relationships" xmlns:p="http://schemas.openxmlformats.org/presentationml/2006/main">
+  <p:cSld>
+    <p:spTree>
+      <p:nvGrpSpPr>
+        <p:cNvPr id="1" name=""/>
+        <p:cNvGrpSpPr/>
+        <p:nvPr/>
+      </p:nvGrpSpPr>
+      <p:grpSpPr>
+        <a:xfrm>
+          <a:off x="0" y="0"/>
+          <a:ext cx="0" cy="0"/>
+          <a:chOff x="0" y="0"/>
+          <a:chExt cx="0" cy="0"/>
+        </a:xfrm>
+      </p:grpSpPr>
+      <p:sp>
+        <p:nvSpPr>
+          <p:cNvPr id="2" name="Title 1"/>
+          <p:cNvSpPr>
+            <a:spLocks noGrp="1"/>
+          </p:cNvSpPr>
+          <p:nvPr>
+            <p:ph type="title"/>
+          </p:nvPr>
+        </p:nvSpPr>
+        <p:spPr/>
+        <p:txBody>
+          <a:bodyPr/>
+          <a:lstStyle/>
+          <a:p>
+            <a:r>
+              <a:rPr lang="en-US" dirty="0" smtClean="0"/>
+              <a:t>Example</a:t>
+            </a:r>
+            <a:endParaRPr lang="en-US" dirty="0"/>
+          </a:p>
+        </p:txBody>
+      </p:sp>
+      <p:sp>
+        <p:nvSpPr>
+          <p:cNvPr id="3" name="Content Placeholder 2"/>
+          <p:cNvSpPr>
+            <a:spLocks noGrp="1"/>
+          </p:cNvSpPr>
+          <p:nvPr>
+            <p:ph idx="1"/>
+          </p:nvPr>
+        </p:nvSpPr>
+        <p:spPr/>
+        <p:txBody>
+          <a:bodyPr/>
+          <a:lstStyle/>
+          <a:p>
+            <a:r>
+              <a:rPr lang="en-US" dirty="0" smtClean="0"/>
+              <a:t>Convert 0xF3E to its binary equivalent.</a:t>
+            </a:r>
+            <a:endParaRPr lang="en-US" dirty="0"/>
+          </a:p>
+        </p:txBody>
+      </p:sp>
+    </p:spTree>
+    <p:extLst>
+      <p:ext uri="{BB962C8B-B14F-4D97-AF65-F5344CB8AC3E}">
+        <p14:creationId xmlns:p14="http://schemas.microsoft.com/office/powerpoint/2010/main" val="3666127741"/>
+      </p:ext>
+    </p:extLst>
+  </p:cSld>
+  <p:clrMapOvr>
+    <a:masterClrMapping/>
+  </p:clrMapOvr>
+</p:sld>
+</file>
+
+<file path=ppt/slides/slide22.xml><?xml version="1.0" encoding="utf-8"?>
+<p:sld xmlns:a="http://schemas.openxmlformats.org/drawingml/2006/main" xmlns:r="http://schemas.openxmlformats.org/officeDocument/2006/relationships" xmlns:p="http://schemas.openxmlformats.org/presentationml/2006/main">
+  <p:cSld>
+    <p:spTree>
+      <p:nvGrpSpPr>
+        <p:cNvPr id="1" name=""/>
+        <p:cNvGrpSpPr/>
+        <p:nvPr/>
+      </p:nvGrpSpPr>
+      <p:grpSpPr>
+        <a:xfrm>
+          <a:off x="0" y="0"/>
+          <a:ext cx="0" cy="0"/>
+          <a:chOff x="0" y="0"/>
+          <a:chExt cx="0" cy="0"/>
+        </a:xfrm>
+      </p:grpSpPr>
+      <p:sp>
+        <p:nvSpPr>
+          <p:cNvPr id="2" name="Title 1"/>
+          <p:cNvSpPr>
+            <a:spLocks noGrp="1"/>
+          </p:cNvSpPr>
+          <p:nvPr>
+            <p:ph type="title"/>
+          </p:nvPr>
+        </p:nvSpPr>
+        <p:spPr/>
+        <p:txBody>
+          <a:bodyPr/>
+          <a:lstStyle/>
+          <a:p>
+            <a:r>
               <a:rPr lang="en-CA" dirty="0" smtClean="0"/>
               <a:t>Binary Addition</a:t>
             </a:r>
@@ -6478,7 +6671,6 @@
               <a:rPr lang="en-US" dirty="0" smtClean="0"/>
               <a:t> FRAMES_PER_SECOND = 30;</a:t>
             </a:r>
-            <a:endParaRPr lang="en-US" dirty="0" smtClean="0"/>
           </a:p>
           <a:p>
             <a:endParaRPr lang="en-US" dirty="0"/>
@@ -6486,11 +6678,7 @@
           <a:p>
             <a:r>
               <a:rPr lang="en-US" dirty="0" smtClean="0"/>
-              <a:t>Makes it easier to modify code (NO MAGIC NUMBERS</a:t>
-            </a:r>
-            <a:r>
-              <a:rPr lang="en-US" dirty="0" smtClean="0"/>
-              <a:t>)</a:t>
+              <a:t>Makes it easier to modify code (NO MAGIC NUMBERS)</a:t>
             </a:r>
           </a:p>
           <a:p>
@@ -6592,11 +6780,7 @@
           <a:p>
             <a:r>
               <a:rPr lang="en-US" dirty="0" smtClean="0"/>
-              <a:t>Only digits 0 and 1 are used</a:t>
-            </a:r>
-            <a:r>
-              <a:rPr lang="en-US" dirty="0" smtClean="0"/>
-              <a:t>.</a:t>
+              <a:t>Only digits 0 and 1 are used.</a:t>
             </a:r>
           </a:p>
           <a:p>
@@ -6604,16 +6788,11 @@
               <a:rPr lang="en-US" dirty="0" smtClean="0"/>
               <a:t>In Java: 			0b1101</a:t>
             </a:r>
-            <a:endParaRPr lang="en-US" dirty="0" smtClean="0"/>
-          </a:p>
-          <a:p>
-            <a:r>
-              <a:rPr lang="en-US" dirty="0" smtClean="0"/>
-              <a:t>When writing: 	</a:t>
-            </a:r>
-            <a:r>
-              <a:rPr lang="en-US" dirty="0" smtClean="0"/>
-              <a:t>1101</a:t>
+          </a:p>
+          <a:p>
+            <a:r>
+              <a:rPr lang="en-US" dirty="0" smtClean="0"/>
+              <a:t>When writing: 	1101</a:t>
             </a:r>
             <a:r>
               <a:rPr lang="en-US" baseline="-25000" dirty="0" smtClean="0"/>
@@ -6892,25 +7071,8 @@
             </a:r>
             <a:r>
               <a:rPr lang="en-US" dirty="0" smtClean="0"/>
-              <a:t>   </a:t>
-            </a:r>
-            <a:r>
-              <a:rPr lang="en-US" dirty="0" smtClean="0"/>
-              <a:t>		</a:t>
-            </a:r>
-            <a:r>
-              <a:rPr lang="en-US" dirty="0" smtClean="0"/>
-              <a:t>(</a:t>
-            </a:r>
-            <a:r>
-              <a:rPr lang="en-US" dirty="0" smtClean="0"/>
-              <a:t>32 bit or 4 bytes</a:t>
-            </a:r>
-            <a:r>
-              <a:rPr lang="en-US" dirty="0" smtClean="0"/>
-              <a:t>)	Integer</a:t>
-            </a:r>
-            <a:endParaRPr lang="en-US" dirty="0" smtClean="0"/>
+              <a:t>   		(32 bit or 4 bytes)	Integer</a:t>
+            </a:r>
           </a:p>
           <a:p>
             <a:pPr marL="0" indent="0">
@@ -6932,25 +7094,8 @@
             </a:r>
             <a:r>
               <a:rPr lang="en-US" dirty="0" smtClean="0"/>
-              <a:t>   </a:t>
-            </a:r>
-            <a:r>
-              <a:rPr lang="en-US" dirty="0" smtClean="0"/>
-              <a:t>	</a:t>
-            </a:r>
-            <a:r>
-              <a:rPr lang="en-US" dirty="0" smtClean="0"/>
-              <a:t>(</a:t>
-            </a:r>
-            <a:r>
-              <a:rPr lang="en-US" dirty="0" smtClean="0"/>
-              <a:t>2 </a:t>
-            </a:r>
-            <a:r>
-              <a:rPr lang="en-US" dirty="0" smtClean="0"/>
-              <a:t>bits)			true/false	</a:t>
-            </a:r>
-            <a:endParaRPr lang="en-US" dirty="0" smtClean="0"/>
+              <a:t>   	(1 bit)			true/false	</a:t>
+            </a:r>
           </a:p>
           <a:p>
             <a:pPr marL="0" indent="0">
@@ -6964,25 +7109,8 @@
             </a:pPr>
             <a:r>
               <a:rPr lang="en-US" dirty="0" smtClean="0"/>
-              <a:t>	double</a:t>
-            </a:r>
-            <a:r>
-              <a:rPr lang="en-US" dirty="0" smtClean="0"/>
-              <a:t>	</a:t>
-            </a:r>
-            <a:r>
-              <a:rPr lang="en-US" dirty="0" smtClean="0"/>
-              <a:t>(</a:t>
-            </a:r>
-            <a:r>
-              <a:rPr lang="en-US" dirty="0" smtClean="0"/>
-              <a:t>64 bits or 8 bytes</a:t>
-            </a:r>
-            <a:r>
-              <a:rPr lang="en-US" dirty="0" smtClean="0"/>
-              <a:t>)	Real</a:t>
-            </a:r>
-            <a:endParaRPr lang="en-US" dirty="0" smtClean="0"/>
+              <a:t>	double	(64 bits or 8 bytes)	Real</a:t>
+            </a:r>
           </a:p>
           <a:p>
             <a:pPr marL="0" indent="0">
@@ -6996,19 +7124,7 @@
             </a:pPr>
             <a:r>
               <a:rPr lang="en-US" dirty="0" smtClean="0"/>
-              <a:t>	float </a:t>
-            </a:r>
-            <a:r>
-              <a:rPr lang="en-US" dirty="0" smtClean="0"/>
-              <a:t>		</a:t>
-            </a:r>
-            <a:r>
-              <a:rPr lang="en-US" dirty="0" smtClean="0"/>
-              <a:t>(</a:t>
-            </a:r>
-            <a:r>
-              <a:rPr lang="en-US" dirty="0" smtClean="0"/>
-              <a:t>32 </a:t>
+              <a:t>	float 		(32 </a:t>
             </a:r>
             <a:r>
               <a:rPr lang="en-US" dirty="0"/>
@@ -7026,7 +7142,6 @@
               <a:rPr lang="en-US" dirty="0" smtClean="0"/>
               <a:t>)	Real</a:t>
             </a:r>
-            <a:endParaRPr lang="en-US" dirty="0" smtClean="0"/>
           </a:p>
           <a:p>
             <a:pPr marL="0" indent="0">
@@ -7040,25 +7155,8 @@
             </a:pPr>
             <a:r>
               <a:rPr lang="en-US" dirty="0" smtClean="0"/>
-              <a:t>	byte </a:t>
-            </a:r>
-            <a:r>
-              <a:rPr lang="en-US" dirty="0" smtClean="0"/>
-              <a:t>		</a:t>
-            </a:r>
-            <a:r>
-              <a:rPr lang="en-US" dirty="0" smtClean="0"/>
-              <a:t>(</a:t>
-            </a:r>
-            <a:r>
-              <a:rPr lang="en-US" dirty="0" smtClean="0"/>
-              <a:t>8 bits or 1 byte</a:t>
-            </a:r>
-            <a:r>
-              <a:rPr lang="en-US" dirty="0" smtClean="0"/>
-              <a:t>)		Integer</a:t>
-            </a:r>
-            <a:endParaRPr lang="en-US" dirty="0" smtClean="0"/>
+              <a:t>	byte 		(8 bits or 1 byte)		Integer</a:t>
+            </a:r>
           </a:p>
           <a:p>
             <a:pPr marL="0" indent="0">
@@ -7072,23 +7170,7 @@
             </a:pPr>
             <a:r>
               <a:rPr lang="en-US" dirty="0" smtClean="0"/>
-              <a:t>	short</a:t>
-            </a:r>
-            <a:r>
-              <a:rPr lang="en-US" dirty="0" smtClean="0"/>
-              <a:t>		</a:t>
-            </a:r>
-            <a:r>
-              <a:rPr lang="en-US" dirty="0" smtClean="0"/>
-              <a:t>(</a:t>
-            </a:r>
-            <a:r>
-              <a:rPr lang="en-US" dirty="0" smtClean="0"/>
-              <a:t>16 bits or 2 bytes</a:t>
-            </a:r>
-            <a:r>
-              <a:rPr lang="en-US" dirty="0" smtClean="0"/>
-              <a:t>)	Integer</a:t>
+              <a:t>	short		(16 bits or 2 bytes)	Integer</a:t>
             </a:r>
           </a:p>
           <a:p>
@@ -7115,11 +7197,11 @@
             </a:r>
             <a:r>
               <a:rPr lang="en-US" dirty="0"/>
-              <a:t>bits or </a:t>
-            </a:r>
-            <a:r>
-              <a:rPr lang="en-US" dirty="0" smtClean="0"/>
-              <a:t>4 </a:t>
+              <a:t>bits or 8</a:t>
+            </a:r>
+            <a:r>
+              <a:rPr lang="en-US" dirty="0" smtClean="0"/>
+              <a:t> </a:t>
             </a:r>
             <a:r>
               <a:rPr lang="en-US" dirty="0"/>

</xml_diff>